<commit_message>
Update Ship Management activity diagram
</commit_message>
<xml_diff>
--- a/docs/diagrams/ShipManagementActivityDiagram.pptx
+++ b/docs/diagrams/ShipManagementActivityDiagram.pptx
@@ -126,7 +126,7 @@
 <file path=ppt/revisionInfo.xml><?xml version="1.0" encoding="utf-8"?>
 <p1510:revInfo xmlns:a="http://schemas.openxmlformats.org/drawingml/2006/main" xmlns:r="http://schemas.openxmlformats.org/officeDocument/2006/relationships" xmlns:p1510="http://schemas.microsoft.com/office/powerpoint/2015/10/main">
   <p1510:revLst>
-    <p1510:client id="{7145A317-C1E9-7348-B306-AC5F456D6326}" v="109" dt="2019-04-12T18:56:15.565"/>
+    <p1510:client id="{7145A317-C1E9-7348-B306-AC5F456D6326}" v="118" dt="2019-04-13T04:28:18.424"/>
   </p1510:revLst>
 </p1510:revInfo>
 </file>
@@ -136,7 +136,7 @@
   <pc:docChgLst>
     <pc:chgData name="Ian Wu Ling En" userId="28715549-2f5c-46f8-b7f8-f39c35f3312d" providerId="ADAL" clId="{7145A317-C1E9-7348-B306-AC5F456D6326}"/>
     <pc:docChg chg="undo redo custSel addSld delSld modSld modMainMaster">
-      <pc:chgData name="Ian Wu Ling En" userId="28715549-2f5c-46f8-b7f8-f39c35f3312d" providerId="ADAL" clId="{7145A317-C1E9-7348-B306-AC5F456D6326}" dt="2019-04-12T19:02:47.829" v="971" actId="1035"/>
+      <pc:chgData name="Ian Wu Ling En" userId="28715549-2f5c-46f8-b7f8-f39c35f3312d" providerId="ADAL" clId="{7145A317-C1E9-7348-B306-AC5F456D6326}" dt="2019-04-13T04:28:18.424" v="1039" actId="552"/>
       <pc:docMkLst>
         <pc:docMk/>
       </pc:docMkLst>
@@ -372,11 +372,27 @@
         </pc:cxnChg>
       </pc:sldChg>
       <pc:sldChg chg="addSp delSp modSp add">
-        <pc:chgData name="Ian Wu Ling En" userId="28715549-2f5c-46f8-b7f8-f39c35f3312d" providerId="ADAL" clId="{7145A317-C1E9-7348-B306-AC5F456D6326}" dt="2019-04-12T19:02:47.829" v="971" actId="1035"/>
+        <pc:chgData name="Ian Wu Ling En" userId="28715549-2f5c-46f8-b7f8-f39c35f3312d" providerId="ADAL" clId="{7145A317-C1E9-7348-B306-AC5F456D6326}" dt="2019-04-13T04:28:18.424" v="1039" actId="552"/>
         <pc:sldMkLst>
           <pc:docMk/>
           <pc:sldMk cId="1345368964" sldId="257"/>
         </pc:sldMkLst>
+        <pc:spChg chg="add del mod">
+          <ac:chgData name="Ian Wu Ling En" userId="28715549-2f5c-46f8-b7f8-f39c35f3312d" providerId="ADAL" clId="{7145A317-C1E9-7348-B306-AC5F456D6326}" dt="2019-04-13T04:25:05.198" v="974" actId="11529"/>
+          <ac:spMkLst>
+            <pc:docMk/>
+            <pc:sldMk cId="1345368964" sldId="257"/>
+            <ac:spMk id="2" creationId="{2E6DAE1E-15C0-0342-92C3-C0BF9B480696}"/>
+          </ac:spMkLst>
+        </pc:spChg>
+        <pc:spChg chg="add mod">
+          <ac:chgData name="Ian Wu Ling En" userId="28715549-2f5c-46f8-b7f8-f39c35f3312d" providerId="ADAL" clId="{7145A317-C1E9-7348-B306-AC5F456D6326}" dt="2019-04-13T04:26:04.676" v="989" actId="13822"/>
+          <ac:spMkLst>
+            <pc:docMk/>
+            <pc:sldMk cId="1345368964" sldId="257"/>
+            <ac:spMk id="3" creationId="{7100A64E-7057-B946-BB3A-FDE67BEB2DB3}"/>
+          </ac:spMkLst>
+        </pc:spChg>
         <pc:spChg chg="del mod">
           <ac:chgData name="Ian Wu Ling En" userId="28715549-2f5c-46f8-b7f8-f39c35f3312d" providerId="ADAL" clId="{7145A317-C1E9-7348-B306-AC5F456D6326}" dt="2019-04-12T18:24:45.589" v="213" actId="478"/>
           <ac:spMkLst>
@@ -417,6 +433,22 @@
             <ac:spMk id="47" creationId="{791A7435-1CBD-4D64-B373-CDF617409EFD}"/>
           </ac:spMkLst>
         </pc:spChg>
+        <pc:spChg chg="add del mod">
+          <ac:chgData name="Ian Wu Ling En" userId="28715549-2f5c-46f8-b7f8-f39c35f3312d" providerId="ADAL" clId="{7145A317-C1E9-7348-B306-AC5F456D6326}" dt="2019-04-13T04:25:27.333" v="978" actId="478"/>
+          <ac:spMkLst>
+            <pc:docMk/>
+            <pc:sldMk cId="1345368964" sldId="257"/>
+            <ac:spMk id="50" creationId="{ACCDAC58-443C-5C4A-8767-EC5FBE96EAB9}"/>
+          </ac:spMkLst>
+        </pc:spChg>
+        <pc:spChg chg="add mod">
+          <ac:chgData name="Ian Wu Ling En" userId="28715549-2f5c-46f8-b7f8-f39c35f3312d" providerId="ADAL" clId="{7145A317-C1E9-7348-B306-AC5F456D6326}" dt="2019-04-13T04:26:16.604" v="1004" actId="1037"/>
+          <ac:spMkLst>
+            <pc:docMk/>
+            <pc:sldMk cId="1345368964" sldId="257"/>
+            <ac:spMk id="51" creationId="{CE464CC1-6250-F246-AF64-11AA980E65A7}"/>
+          </ac:spMkLst>
+        </pc:spChg>
         <pc:spChg chg="mod">
           <ac:chgData name="Ian Wu Ling En" userId="28715549-2f5c-46f8-b7f8-f39c35f3312d" providerId="ADAL" clId="{7145A317-C1E9-7348-B306-AC5F456D6326}" dt="2019-04-12T18:24:14.939" v="207" actId="164"/>
           <ac:spMkLst>
@@ -425,6 +457,22 @@
             <ac:spMk id="56" creationId="{0ACD7DC4-F31E-42B2-9D34-41B1AE997EB1}"/>
           </ac:spMkLst>
         </pc:spChg>
+        <pc:spChg chg="add mod">
+          <ac:chgData name="Ian Wu Ling En" userId="28715549-2f5c-46f8-b7f8-f39c35f3312d" providerId="ADAL" clId="{7145A317-C1E9-7348-B306-AC5F456D6326}" dt="2019-04-13T04:28:18.424" v="1039" actId="552"/>
+          <ac:spMkLst>
+            <pc:docMk/>
+            <pc:sldMk cId="1345368964" sldId="257"/>
+            <ac:spMk id="61" creationId="{EB0B484C-89B9-594C-BBA0-D7F4E51CD215}"/>
+          </ac:spMkLst>
+        </pc:spChg>
+        <pc:spChg chg="add mod">
+          <ac:chgData name="Ian Wu Ling En" userId="28715549-2f5c-46f8-b7f8-f39c35f3312d" providerId="ADAL" clId="{7145A317-C1E9-7348-B306-AC5F456D6326}" dt="2019-04-13T04:28:03.846" v="1036" actId="14100"/>
+          <ac:spMkLst>
+            <pc:docMk/>
+            <pc:sldMk cId="1345368964" sldId="257"/>
+            <ac:spMk id="62" creationId="{DE9326E3-09ED-604F-BD7C-1FE5B63FA200}"/>
+          </ac:spMkLst>
+        </pc:spChg>
         <pc:spChg chg="add del mod">
           <ac:chgData name="Ian Wu Ling En" userId="28715549-2f5c-46f8-b7f8-f39c35f3312d" providerId="ADAL" clId="{7145A317-C1E9-7348-B306-AC5F456D6326}" dt="2019-04-12T18:56:20.608" v="957" actId="1076"/>
           <ac:spMkLst>
@@ -458,7 +506,7 @@
           </ac:spMkLst>
         </pc:spChg>
         <pc:spChg chg="add del mod">
-          <ac:chgData name="Ian Wu Ling En" userId="28715549-2f5c-46f8-b7f8-f39c35f3312d" providerId="ADAL" clId="{7145A317-C1E9-7348-B306-AC5F456D6326}" dt="2019-04-12T18:56:20.608" v="957" actId="1076"/>
+          <ac:chgData name="Ian Wu Ling En" userId="28715549-2f5c-46f8-b7f8-f39c35f3312d" providerId="ADAL" clId="{7145A317-C1E9-7348-B306-AC5F456D6326}" dt="2019-04-13T04:26:50.771" v="1021" actId="1076"/>
           <ac:spMkLst>
             <pc:docMk/>
             <pc:sldMk cId="1345368964" sldId="257"/>
@@ -570,7 +618,7 @@
           </ac:spMkLst>
         </pc:spChg>
         <pc:spChg chg="add del mod">
-          <ac:chgData name="Ian Wu Ling En" userId="28715549-2f5c-46f8-b7f8-f39c35f3312d" providerId="ADAL" clId="{7145A317-C1E9-7348-B306-AC5F456D6326}" dt="2019-04-12T18:56:20.608" v="957" actId="1076"/>
+          <ac:chgData name="Ian Wu Ling En" userId="28715549-2f5c-46f8-b7f8-f39c35f3312d" providerId="ADAL" clId="{7145A317-C1E9-7348-B306-AC5F456D6326}" dt="2019-04-13T04:27:52.043" v="1034" actId="1076"/>
           <ac:spMkLst>
             <pc:docMk/>
             <pc:sldMk cId="1345368964" sldId="257"/>
@@ -594,7 +642,7 @@
           </ac:spMkLst>
         </pc:spChg>
         <pc:spChg chg="add del mod">
-          <ac:chgData name="Ian Wu Ling En" userId="28715549-2f5c-46f8-b7f8-f39c35f3312d" providerId="ADAL" clId="{7145A317-C1E9-7348-B306-AC5F456D6326}" dt="2019-04-12T18:56:20.608" v="957" actId="1076"/>
+          <ac:chgData name="Ian Wu Ling En" userId="28715549-2f5c-46f8-b7f8-f39c35f3312d" providerId="ADAL" clId="{7145A317-C1E9-7348-B306-AC5F456D6326}" dt="2019-04-13T04:27:38.492" v="1029" actId="1076"/>
           <ac:spMkLst>
             <pc:docMk/>
             <pc:sldMk cId="1345368964" sldId="257"/>
@@ -618,7 +666,7 @@
           </ac:spMkLst>
         </pc:spChg>
         <pc:spChg chg="add del mod">
-          <ac:chgData name="Ian Wu Ling En" userId="28715549-2f5c-46f8-b7f8-f39c35f3312d" providerId="ADAL" clId="{7145A317-C1E9-7348-B306-AC5F456D6326}" dt="2019-04-12T18:56:20.608" v="957" actId="1076"/>
+          <ac:chgData name="Ian Wu Ling En" userId="28715549-2f5c-46f8-b7f8-f39c35f3312d" providerId="ADAL" clId="{7145A317-C1E9-7348-B306-AC5F456D6326}" dt="2019-04-13T04:28:18.424" v="1039" actId="552"/>
           <ac:spMkLst>
             <pc:docMk/>
             <pc:sldMk cId="1345368964" sldId="257"/>
@@ -793,6 +841,14 @@
             <ac:spMk id="397" creationId="{34B66E57-D535-7C42-91EB-54D081E45076}"/>
           </ac:spMkLst>
         </pc:spChg>
+        <pc:grpChg chg="add mod">
+          <ac:chgData name="Ian Wu Ling En" userId="28715549-2f5c-46f8-b7f8-f39c35f3312d" providerId="ADAL" clId="{7145A317-C1E9-7348-B306-AC5F456D6326}" dt="2019-04-13T04:26:31.096" v="1015" actId="1037"/>
+          <ac:grpSpMkLst>
+            <pc:docMk/>
+            <pc:sldMk cId="1345368964" sldId="257"/>
+            <ac:grpSpMk id="4" creationId="{794B1EDE-CA4F-4A44-8A20-DB102F879365}"/>
+          </ac:grpSpMkLst>
+        </pc:grpChg>
         <pc:grpChg chg="add del mod">
           <ac:chgData name="Ian Wu Ling En" userId="28715549-2f5c-46f8-b7f8-f39c35f3312d" providerId="ADAL" clId="{7145A317-C1E9-7348-B306-AC5F456D6326}" dt="2019-04-12T18:24:45.589" v="213" actId="478"/>
           <ac:grpSpMkLst>
@@ -906,7 +962,7 @@
           </ac:cxnSpMkLst>
         </pc:cxnChg>
         <pc:cxnChg chg="add del mod">
-          <ac:chgData name="Ian Wu Ling En" userId="28715549-2f5c-46f8-b7f8-f39c35f3312d" providerId="ADAL" clId="{7145A317-C1E9-7348-B306-AC5F456D6326}" dt="2019-04-12T18:56:20.608" v="957" actId="1076"/>
+          <ac:chgData name="Ian Wu Ling En" userId="28715549-2f5c-46f8-b7f8-f39c35f3312d" providerId="ADAL" clId="{7145A317-C1E9-7348-B306-AC5F456D6326}" dt="2019-04-13T04:26:46.737" v="1020" actId="14100"/>
           <ac:cxnSpMkLst>
             <pc:docMk/>
             <pc:sldMk cId="1345368964" sldId="257"/>
@@ -978,7 +1034,7 @@
           </ac:cxnSpMkLst>
         </pc:cxnChg>
         <pc:cxnChg chg="add del mod">
-          <ac:chgData name="Ian Wu Ling En" userId="28715549-2f5c-46f8-b7f8-f39c35f3312d" providerId="ADAL" clId="{7145A317-C1E9-7348-B306-AC5F456D6326}" dt="2019-04-12T18:56:20.608" v="957" actId="1076"/>
+          <ac:chgData name="Ian Wu Ling En" userId="28715549-2f5c-46f8-b7f8-f39c35f3312d" providerId="ADAL" clId="{7145A317-C1E9-7348-B306-AC5F456D6326}" dt="2019-04-13T04:27:52.043" v="1034" actId="1076"/>
           <ac:cxnSpMkLst>
             <pc:docMk/>
             <pc:sldMk cId="1345368964" sldId="257"/>
@@ -994,7 +1050,7 @@
           </ac:cxnSpMkLst>
         </pc:cxnChg>
         <pc:cxnChg chg="add del mod">
-          <ac:chgData name="Ian Wu Ling En" userId="28715549-2f5c-46f8-b7f8-f39c35f3312d" providerId="ADAL" clId="{7145A317-C1E9-7348-B306-AC5F456D6326}" dt="2019-04-12T18:56:20.608" v="957" actId="1076"/>
+          <ac:chgData name="Ian Wu Ling En" userId="28715549-2f5c-46f8-b7f8-f39c35f3312d" providerId="ADAL" clId="{7145A317-C1E9-7348-B306-AC5F456D6326}" dt="2019-04-13T04:27:52.043" v="1034" actId="1076"/>
           <ac:cxnSpMkLst>
             <pc:docMk/>
             <pc:sldMk cId="1345368964" sldId="257"/>
@@ -1010,7 +1066,7 @@
           </ac:cxnSpMkLst>
         </pc:cxnChg>
         <pc:cxnChg chg="add del mod">
-          <ac:chgData name="Ian Wu Ling En" userId="28715549-2f5c-46f8-b7f8-f39c35f3312d" providerId="ADAL" clId="{7145A317-C1E9-7348-B306-AC5F456D6326}" dt="2019-04-12T18:56:20.608" v="957" actId="1076"/>
+          <ac:chgData name="Ian Wu Ling En" userId="28715549-2f5c-46f8-b7f8-f39c35f3312d" providerId="ADAL" clId="{7145A317-C1E9-7348-B306-AC5F456D6326}" dt="2019-04-13T04:27:58.810" v="1035" actId="14100"/>
           <ac:cxnSpMkLst>
             <pc:docMk/>
             <pc:sldMk cId="1345368964" sldId="257"/>
@@ -1058,7 +1114,7 @@
           </ac:cxnSpMkLst>
         </pc:cxnChg>
         <pc:cxnChg chg="add del mod">
-          <ac:chgData name="Ian Wu Ling En" userId="28715549-2f5c-46f8-b7f8-f39c35f3312d" providerId="ADAL" clId="{7145A317-C1E9-7348-B306-AC5F456D6326}" dt="2019-04-12T18:56:20.608" v="957" actId="1076"/>
+          <ac:chgData name="Ian Wu Ling En" userId="28715549-2f5c-46f8-b7f8-f39c35f3312d" providerId="ADAL" clId="{7145A317-C1E9-7348-B306-AC5F456D6326}" dt="2019-04-13T04:27:19.178" v="1024" actId="14100"/>
           <ac:cxnSpMkLst>
             <pc:docMk/>
             <pc:sldMk cId="1345368964" sldId="257"/>
@@ -1122,7 +1178,7 @@
           </ac:cxnSpMkLst>
         </pc:cxnChg>
         <pc:cxnChg chg="add del mod">
-          <ac:chgData name="Ian Wu Ling En" userId="28715549-2f5c-46f8-b7f8-f39c35f3312d" providerId="ADAL" clId="{7145A317-C1E9-7348-B306-AC5F456D6326}" dt="2019-04-12T18:56:20.608" v="957" actId="1076"/>
+          <ac:chgData name="Ian Wu Ling En" userId="28715549-2f5c-46f8-b7f8-f39c35f3312d" providerId="ADAL" clId="{7145A317-C1E9-7348-B306-AC5F456D6326}" dt="2019-04-13T04:27:52.043" v="1034" actId="1076"/>
           <ac:cxnSpMkLst>
             <pc:docMk/>
             <pc:sldMk cId="1345368964" sldId="257"/>
@@ -5127,19 +5183,20 @@
           </p:cNvPr>
           <p:cNvCxnSpPr>
             <a:cxnSpLocks/>
-            <a:stCxn id="76" idx="0"/>
+            <a:stCxn id="3" idx="2"/>
             <a:endCxn id="73" idx="0"/>
           </p:cNvCxnSpPr>
           <p:nvPr/>
         </p:nvCxnSpPr>
         <p:spPr>
-          <a:xfrm rot="16200000" flipV="1">
-            <a:off x="3031369" y="2039106"/>
-            <a:ext cx="231531" cy="1749438"/>
+          <a:xfrm flipH="1">
+            <a:off x="2272413" y="2229158"/>
+            <a:ext cx="1452998" cy="568901"/>
           </a:xfrm>
-          <a:prstGeom prst="bentConnector3">
+          <a:prstGeom prst="bentConnector4">
             <a:avLst>
-              <a:gd name="adj1" fmla="val 250529"/>
+              <a:gd name="adj1" fmla="val -121"/>
+              <a:gd name="adj2" fmla="val -217"/>
             </a:avLst>
           </a:prstGeom>
           <a:ln>
@@ -5175,7 +5232,7 @@
         </p:nvSpPr>
         <p:spPr>
           <a:xfrm>
-            <a:off x="1850476" y="1429907"/>
+            <a:off x="1850476" y="1291512"/>
             <a:ext cx="1848780" cy="923458"/>
           </a:xfrm>
           <a:prstGeom prst="rect">
@@ -5960,8 +6017,8 @@
         </p:nvSpPr>
         <p:spPr>
           <a:xfrm>
-            <a:off x="6023046" y="472236"/>
-            <a:ext cx="4153838" cy="369460"/>
+            <a:off x="6098460" y="1122685"/>
+            <a:ext cx="1914323" cy="646587"/>
           </a:xfrm>
           <a:prstGeom prst="rect">
             <a:avLst/>
@@ -6005,7 +6062,7 @@
           </a:xfrm>
           <a:prstGeom prst="bentConnector3">
             <a:avLst>
-              <a:gd name="adj1" fmla="val 144586"/>
+              <a:gd name="adj1" fmla="val 140082"/>
             </a:avLst>
           </a:prstGeom>
           <a:ln>
@@ -6041,8 +6098,8 @@
         </p:nvSpPr>
         <p:spPr>
           <a:xfrm>
-            <a:off x="6010521" y="5170206"/>
-            <a:ext cx="3797317" cy="369460"/>
+            <a:off x="3597260" y="5217340"/>
+            <a:ext cx="2011689" cy="646587"/>
           </a:xfrm>
           <a:prstGeom prst="rect">
             <a:avLst/>
@@ -6119,19 +6176,20 @@
           </p:cNvPr>
           <p:cNvCxnSpPr>
             <a:cxnSpLocks/>
-            <a:stCxn id="377" idx="0"/>
+            <a:stCxn id="51" idx="2"/>
             <a:endCxn id="149" idx="0"/>
           </p:cNvCxnSpPr>
           <p:nvPr/>
         </p:nvCxnSpPr>
         <p:spPr>
-          <a:xfrm rot="5400000" flipH="1" flipV="1">
-            <a:off x="6248044" y="-163108"/>
-            <a:ext cx="1173851" cy="5437015"/>
+          <a:xfrm rot="10800000" flipH="1">
+            <a:off x="4310036" y="1968474"/>
+            <a:ext cx="5243439" cy="260685"/>
           </a:xfrm>
-          <a:prstGeom prst="bentConnector3">
+          <a:prstGeom prst="bentConnector4">
             <a:avLst>
-              <a:gd name="adj1" fmla="val 187768"/>
+              <a:gd name="adj1" fmla="val -33"/>
+              <a:gd name="adj2" fmla="val 520379"/>
             </a:avLst>
           </a:prstGeom>
           <a:ln>
@@ -6658,6 +6716,255 @@
           </a:fontRef>
         </p:style>
       </p:cxnSp>
+      <p:grpSp>
+        <p:nvGrpSpPr>
+          <p:cNvPr id="4" name="Group 3">
+            <a:extLst>
+              <a:ext uri="{FF2B5EF4-FFF2-40B4-BE49-F238E27FC236}">
+                <a16:creationId xmlns:a16="http://schemas.microsoft.com/office/drawing/2014/main" id="{794B1EDE-CA4F-4A44-8A20-DB102F879365}"/>
+              </a:ext>
+            </a:extLst>
+          </p:cNvPr>
+          <p:cNvGrpSpPr/>
+          <p:nvPr/>
+        </p:nvGrpSpPr>
+        <p:grpSpPr>
+          <a:xfrm>
+            <a:off x="3725411" y="2229158"/>
+            <a:ext cx="584626" cy="806503"/>
+            <a:chOff x="490653" y="5508702"/>
+            <a:chExt cx="825680" cy="1170878"/>
+          </a:xfrm>
+        </p:grpSpPr>
+        <p:sp>
+          <p:nvSpPr>
+            <p:cNvPr id="3" name="Freeform 2">
+              <a:extLst>
+                <a:ext uri="{FF2B5EF4-FFF2-40B4-BE49-F238E27FC236}">
+                  <a16:creationId xmlns:a16="http://schemas.microsoft.com/office/drawing/2014/main" id="{7100A64E-7057-B946-BB3A-FDE67BEB2DB3}"/>
+                </a:ext>
+              </a:extLst>
+            </p:cNvPr>
+            <p:cNvSpPr/>
+            <p:nvPr/>
+          </p:nvSpPr>
+          <p:spPr>
+            <a:xfrm>
+              <a:off x="490653" y="5508702"/>
+              <a:ext cx="412596" cy="1170878"/>
+            </a:xfrm>
+            <a:custGeom>
+              <a:avLst/>
+              <a:gdLst>
+                <a:gd name="connsiteX0" fmla="*/ 412596 w 412596"/>
+                <a:gd name="connsiteY0" fmla="*/ 1170878 h 1170878"/>
+                <a:gd name="connsiteX1" fmla="*/ 412596 w 412596"/>
+                <a:gd name="connsiteY1" fmla="*/ 412596 h 1170878"/>
+                <a:gd name="connsiteX2" fmla="*/ 0 w 412596"/>
+                <a:gd name="connsiteY2" fmla="*/ 0 h 1170878"/>
+              </a:gdLst>
+              <a:ahLst/>
+              <a:cxnLst>
+                <a:cxn ang="0">
+                  <a:pos x="connsiteX0" y="connsiteY0"/>
+                </a:cxn>
+                <a:cxn ang="0">
+                  <a:pos x="connsiteX1" y="connsiteY1"/>
+                </a:cxn>
+                <a:cxn ang="0">
+                  <a:pos x="connsiteX2" y="connsiteY2"/>
+                </a:cxn>
+              </a:cxnLst>
+              <a:rect l="l" t="t" r="r" b="b"/>
+              <a:pathLst>
+                <a:path w="412596" h="1170878">
+                  <a:moveTo>
+                    <a:pt x="412596" y="1170878"/>
+                  </a:moveTo>
+                  <a:lnTo>
+                    <a:pt x="412596" y="412596"/>
+                  </a:lnTo>
+                  <a:lnTo>
+                    <a:pt x="0" y="0"/>
+                  </a:lnTo>
+                </a:path>
+              </a:pathLst>
+            </a:custGeom>
+          </p:spPr>
+          <p:style>
+            <a:lnRef idx="1">
+              <a:schemeClr val="dk1"/>
+            </a:lnRef>
+            <a:fillRef idx="0">
+              <a:schemeClr val="dk1"/>
+            </a:fillRef>
+            <a:effectRef idx="0">
+              <a:schemeClr val="dk1"/>
+            </a:effectRef>
+            <a:fontRef idx="minor">
+              <a:schemeClr val="tx1"/>
+            </a:fontRef>
+          </p:style>
+          <p:txBody>
+            <a:bodyPr rtlCol="0" anchor="ctr"/>
+            <a:lstStyle/>
+            <a:p>
+              <a:pPr algn="ctr"/>
+              <a:endParaRPr lang="is-IS"/>
+            </a:p>
+          </p:txBody>
+        </p:sp>
+        <p:sp>
+          <p:nvSpPr>
+            <p:cNvPr id="51" name="Freeform 50">
+              <a:extLst>
+                <a:ext uri="{FF2B5EF4-FFF2-40B4-BE49-F238E27FC236}">
+                  <a16:creationId xmlns:a16="http://schemas.microsoft.com/office/drawing/2014/main" id="{CE464CC1-6250-F246-AF64-11AA980E65A7}"/>
+                </a:ext>
+              </a:extLst>
+            </p:cNvPr>
+            <p:cNvSpPr/>
+            <p:nvPr/>
+          </p:nvSpPr>
+          <p:spPr>
+            <a:xfrm flipH="1">
+              <a:off x="903737" y="5508702"/>
+              <a:ext cx="412596" cy="1170878"/>
+            </a:xfrm>
+            <a:custGeom>
+              <a:avLst/>
+              <a:gdLst>
+                <a:gd name="connsiteX0" fmla="*/ 412596 w 412596"/>
+                <a:gd name="connsiteY0" fmla="*/ 1170878 h 1170878"/>
+                <a:gd name="connsiteX1" fmla="*/ 412596 w 412596"/>
+                <a:gd name="connsiteY1" fmla="*/ 412596 h 1170878"/>
+                <a:gd name="connsiteX2" fmla="*/ 0 w 412596"/>
+                <a:gd name="connsiteY2" fmla="*/ 0 h 1170878"/>
+              </a:gdLst>
+              <a:ahLst/>
+              <a:cxnLst>
+                <a:cxn ang="0">
+                  <a:pos x="connsiteX0" y="connsiteY0"/>
+                </a:cxn>
+                <a:cxn ang="0">
+                  <a:pos x="connsiteX1" y="connsiteY1"/>
+                </a:cxn>
+                <a:cxn ang="0">
+                  <a:pos x="connsiteX2" y="connsiteY2"/>
+                </a:cxn>
+              </a:cxnLst>
+              <a:rect l="l" t="t" r="r" b="b"/>
+              <a:pathLst>
+                <a:path w="412596" h="1170878">
+                  <a:moveTo>
+                    <a:pt x="412596" y="1170878"/>
+                  </a:moveTo>
+                  <a:lnTo>
+                    <a:pt x="412596" y="412596"/>
+                  </a:lnTo>
+                  <a:lnTo>
+                    <a:pt x="0" y="0"/>
+                  </a:lnTo>
+                </a:path>
+              </a:pathLst>
+            </a:custGeom>
+          </p:spPr>
+          <p:style>
+            <a:lnRef idx="1">
+              <a:schemeClr val="dk1"/>
+            </a:lnRef>
+            <a:fillRef idx="0">
+              <a:schemeClr val="dk1"/>
+            </a:fillRef>
+            <a:effectRef idx="0">
+              <a:schemeClr val="dk1"/>
+            </a:effectRef>
+            <a:fontRef idx="minor">
+              <a:schemeClr val="tx1"/>
+            </a:fontRef>
+          </p:style>
+          <p:txBody>
+            <a:bodyPr rtlCol="0" anchor="ctr"/>
+            <a:lstStyle/>
+            <a:p>
+              <a:pPr algn="ctr"/>
+              <a:endParaRPr lang="is-IS"/>
+            </a:p>
+          </p:txBody>
+        </p:sp>
+      </p:grpSp>
+      <p:sp>
+        <p:nvSpPr>
+          <p:cNvPr id="61" name="TextBox 60">
+            <a:extLst>
+              <a:ext uri="{FF2B5EF4-FFF2-40B4-BE49-F238E27FC236}">
+                <a16:creationId xmlns:a16="http://schemas.microsoft.com/office/drawing/2014/main" id="{EB0B484C-89B9-594C-BBA0-D7F4E51CD215}"/>
+              </a:ext>
+            </a:extLst>
+          </p:cNvPr>
+          <p:cNvSpPr txBox="1"/>
+          <p:nvPr/>
+        </p:nvSpPr>
+        <p:spPr>
+          <a:xfrm>
+            <a:off x="3597260" y="208285"/>
+            <a:ext cx="1896699" cy="646587"/>
+          </a:xfrm>
+          <a:prstGeom prst="rect">
+            <a:avLst/>
+          </a:prstGeom>
+          <a:noFill/>
+        </p:spPr>
+        <p:txBody>
+          <a:bodyPr wrap="square" rtlCol="0">
+            <a:spAutoFit/>
+          </a:bodyPr>
+          <a:lstStyle/>
+          <a:p>
+            <a:pPr algn="ctr"/>
+            <a:r>
+              <a:rPr lang="en-SG" sz="1801" dirty="0"/>
+              <a:t>[user wants to see tags of all ships]</a:t>
+            </a:r>
+          </a:p>
+        </p:txBody>
+      </p:sp>
+      <p:sp>
+        <p:nvSpPr>
+          <p:cNvPr id="62" name="TextBox 61">
+            <a:extLst>
+              <a:ext uri="{FF2B5EF4-FFF2-40B4-BE49-F238E27FC236}">
+                <a16:creationId xmlns:a16="http://schemas.microsoft.com/office/drawing/2014/main" id="{DE9326E3-09ED-604F-BD7C-1FE5B63FA200}"/>
+              </a:ext>
+            </a:extLst>
+          </p:cNvPr>
+          <p:cNvSpPr txBox="1"/>
+          <p:nvPr/>
+        </p:nvSpPr>
+        <p:spPr>
+          <a:xfrm>
+            <a:off x="6101347" y="3823341"/>
+            <a:ext cx="1392962" cy="923714"/>
+          </a:xfrm>
+          <a:prstGeom prst="rect">
+            <a:avLst/>
+          </a:prstGeom>
+          <a:noFill/>
+        </p:spPr>
+        <p:txBody>
+          <a:bodyPr wrap="square" rtlCol="0">
+            <a:spAutoFit/>
+          </a:bodyPr>
+          <a:lstStyle/>
+          <a:p>
+            <a:pPr algn="ctr"/>
+            <a:r>
+              <a:rPr lang="en-SG" sz="1801" dirty="0"/>
+              <a:t>[user wants to see ships deployed]</a:t>
+            </a:r>
+          </a:p>
+        </p:txBody>
+      </p:sp>
     </p:spTree>
     <p:extLst>
       <p:ext uri="{BB962C8B-B14F-4D97-AF65-F5344CB8AC3E}">

</xml_diff>